<commit_message>
Add skill learning for adventurer, skill learning event handling and IA basic fight
</commit_message>
<xml_diff>
--- a/docs/architecture/SaltyEmu_Architecture.pptx
+++ b/docs/architecture/SaltyEmu_Architecture.pptx
@@ -8,6 +8,7 @@
     <p:sldId id="258" r:id="rId2"/>
     <p:sldId id="257" r:id="rId3"/>
     <p:sldId id="256" r:id="rId4"/>
+    <p:sldId id="259" r:id="rId5"/>
   </p:sldIdLst>
   <p:sldSz cx="12192000" cy="6858000"/>
   <p:notesSz cx="6858000" cy="9144000"/>
@@ -106,6 +107,11 @@
       </a:defRPr>
     </a:lvl9pPr>
   </p:defaultTextStyle>
+  <p:extLst>
+    <p:ext uri="{EFAFB233-063F-42B5-8137-9DF3F51BA10A}">
+      <p15:sldGuideLst xmlns:p15="http://schemas.microsoft.com/office/powerpoint/2012/main"/>
+    </p:ext>
+  </p:extLst>
 </p:presentation>
 </file>
 
@@ -256,7 +262,7 @@
           <a:p>
             <a:fld id="{8203A14F-56F1-4AD3-96D1-19C1390E772B}" type="datetimeFigureOut">
               <a:rPr lang="en-US" smtClean="0"/>
-              <a:t>1/3/2019</a:t>
+              <a:t>01/18/2019</a:t>
             </a:fld>
             <a:endParaRPr lang="en-US"/>
           </a:p>
@@ -454,7 +460,7 @@
           <a:p>
             <a:fld id="{8203A14F-56F1-4AD3-96D1-19C1390E772B}" type="datetimeFigureOut">
               <a:rPr lang="en-US" smtClean="0"/>
-              <a:t>1/3/2019</a:t>
+              <a:t>01/18/2019</a:t>
             </a:fld>
             <a:endParaRPr lang="en-US"/>
           </a:p>
@@ -662,7 +668,7 @@
           <a:p>
             <a:fld id="{8203A14F-56F1-4AD3-96D1-19C1390E772B}" type="datetimeFigureOut">
               <a:rPr lang="en-US" smtClean="0"/>
-              <a:t>1/3/2019</a:t>
+              <a:t>01/18/2019</a:t>
             </a:fld>
             <a:endParaRPr lang="en-US"/>
           </a:p>
@@ -860,7 +866,7 @@
           <a:p>
             <a:fld id="{8203A14F-56F1-4AD3-96D1-19C1390E772B}" type="datetimeFigureOut">
               <a:rPr lang="en-US" smtClean="0"/>
-              <a:t>1/3/2019</a:t>
+              <a:t>01/18/2019</a:t>
             </a:fld>
             <a:endParaRPr lang="en-US"/>
           </a:p>
@@ -1135,7 +1141,7 @@
           <a:p>
             <a:fld id="{8203A14F-56F1-4AD3-96D1-19C1390E772B}" type="datetimeFigureOut">
               <a:rPr lang="en-US" smtClean="0"/>
-              <a:t>1/3/2019</a:t>
+              <a:t>01/18/2019</a:t>
             </a:fld>
             <a:endParaRPr lang="en-US"/>
           </a:p>
@@ -1400,7 +1406,7 @@
           <a:p>
             <a:fld id="{8203A14F-56F1-4AD3-96D1-19C1390E772B}" type="datetimeFigureOut">
               <a:rPr lang="en-US" smtClean="0"/>
-              <a:t>1/3/2019</a:t>
+              <a:t>01/18/2019</a:t>
             </a:fld>
             <a:endParaRPr lang="en-US"/>
           </a:p>
@@ -1812,7 +1818,7 @@
           <a:p>
             <a:fld id="{8203A14F-56F1-4AD3-96D1-19C1390E772B}" type="datetimeFigureOut">
               <a:rPr lang="en-US" smtClean="0"/>
-              <a:t>1/3/2019</a:t>
+              <a:t>01/18/2019</a:t>
             </a:fld>
             <a:endParaRPr lang="en-US"/>
           </a:p>
@@ -1953,7 +1959,7 @@
           <a:p>
             <a:fld id="{8203A14F-56F1-4AD3-96D1-19C1390E772B}" type="datetimeFigureOut">
               <a:rPr lang="en-US" smtClean="0"/>
-              <a:t>1/3/2019</a:t>
+              <a:t>01/18/2019</a:t>
             </a:fld>
             <a:endParaRPr lang="en-US"/>
           </a:p>
@@ -2066,7 +2072,7 @@
           <a:p>
             <a:fld id="{8203A14F-56F1-4AD3-96D1-19C1390E772B}" type="datetimeFigureOut">
               <a:rPr lang="en-US" smtClean="0"/>
-              <a:t>1/3/2019</a:t>
+              <a:t>01/18/2019</a:t>
             </a:fld>
             <a:endParaRPr lang="en-US"/>
           </a:p>
@@ -2377,7 +2383,7 @@
           <a:p>
             <a:fld id="{8203A14F-56F1-4AD3-96D1-19C1390E772B}" type="datetimeFigureOut">
               <a:rPr lang="en-US" smtClean="0"/>
-              <a:t>1/3/2019</a:t>
+              <a:t>01/18/2019</a:t>
             </a:fld>
             <a:endParaRPr lang="en-US"/>
           </a:p>
@@ -2665,7 +2671,7 @@
           <a:p>
             <a:fld id="{8203A14F-56F1-4AD3-96D1-19C1390E772B}" type="datetimeFigureOut">
               <a:rPr lang="en-US" smtClean="0"/>
-              <a:t>1/3/2019</a:t>
+              <a:t>01/18/2019</a:t>
             </a:fld>
             <a:endParaRPr lang="en-US"/>
           </a:p>
@@ -2906,7 +2912,7 @@
           <a:p>
             <a:fld id="{8203A14F-56F1-4AD3-96D1-19C1390E772B}" type="datetimeFigureOut">
               <a:rPr lang="en-US" smtClean="0"/>
-              <a:t>1/3/2019</a:t>
+              <a:t>01/18/2019</a:t>
             </a:fld>
             <a:endParaRPr lang="en-US"/>
           </a:p>
@@ -3333,7 +3339,7 @@
       </p:grpSpPr>
       <p:sp>
         <p:nvSpPr>
-          <p:cNvPr id="10" name="Rectangle 9">
+          <p:cNvPr id="30" name="Rectangle 21">
             <a:extLst>
               <a:ext uri="{FF2B5EF4-FFF2-40B4-BE49-F238E27FC236}">
                 <a16:creationId xmlns:a16="http://schemas.microsoft.com/office/drawing/2014/main" id="{0BC9EFE1-D8CB-4668-9980-DB108327A794}"/>
@@ -3419,7 +3425,7 @@
       </p:sp>
       <p:pic>
         <p:nvPicPr>
-          <p:cNvPr id="19" name="Picture 11">
+          <p:cNvPr id="31" name="Picture 23">
             <a:extLst>
               <a:ext uri="{FF2B5EF4-FFF2-40B4-BE49-F238E27FC236}">
                 <a16:creationId xmlns:a16="http://schemas.microsoft.com/office/drawing/2014/main" id="{7CBAE1BD-B8E4-4029-8AA2-C77E4FED9864}"/>
@@ -3464,10 +3470,10 @@
       </p:pic>
       <p:sp>
         <p:nvSpPr>
-          <p:cNvPr id="2" name="Title 1">
-            <a:extLst>
-              <a:ext uri="{FF2B5EF4-FFF2-40B4-BE49-F238E27FC236}">
-                <a16:creationId xmlns:a16="http://schemas.microsoft.com/office/drawing/2014/main" id="{5C74EF20-9885-4126-B8FC-4D78E93523F2}"/>
+          <p:cNvPr id="4" name="Title 3">
+            <a:extLst>
+              <a:ext uri="{FF2B5EF4-FFF2-40B4-BE49-F238E27FC236}">
+                <a16:creationId xmlns:a16="http://schemas.microsoft.com/office/drawing/2014/main" id="{2AFA6831-DAB9-4D67-8A2A-DC8325E07D05}"/>
               </a:ext>
             </a:extLst>
           </p:cNvPr>
@@ -3475,7 +3481,7 @@
             <a:spLocks noGrp="1"/>
           </p:cNvSpPr>
           <p:nvPr>
-            <p:ph type="title"/>
+            <p:ph type="ctrTitle"/>
           </p:nvPr>
         </p:nvSpPr>
         <p:spPr>
@@ -3485,25 +3491,71 @@
           </a:xfrm>
         </p:spPr>
         <p:txBody>
-          <a:bodyPr vert="horz" lIns="91440" tIns="45720" rIns="91440" bIns="45720" rtlCol="0" anchor="t">
+          <a:bodyPr anchor="t">
             <a:normAutofit/>
           </a:bodyPr>
           <a:lstStyle/>
           <a:p>
-            <a:r>
-              <a:rPr lang="en-US">
+            <a:pPr algn="l"/>
+            <a:r>
+              <a:rPr lang="en-US" sz="4400">
                 <a:solidFill>
                   <a:srgbClr val="000000"/>
                 </a:solidFill>
               </a:rPr>
-              <a:t>SaltyEmu</a:t>
-            </a:r>
-          </a:p>
-        </p:txBody>
-      </p:sp>
-      <p:sp>
-        <p:nvSpPr>
-          <p:cNvPr id="20" name="Freeform 49">
+              <a:t>SaltyEmu 2.0</a:t>
+            </a:r>
+          </a:p>
+        </p:txBody>
+      </p:sp>
+      <p:sp>
+        <p:nvSpPr>
+          <p:cNvPr id="8" name="Subtitle 7">
+            <a:extLst>
+              <a:ext uri="{FF2B5EF4-FFF2-40B4-BE49-F238E27FC236}">
+                <a16:creationId xmlns:a16="http://schemas.microsoft.com/office/drawing/2014/main" id="{F1E339DD-630F-43FF-B488-786442A4D9AB}"/>
+              </a:ext>
+            </a:extLst>
+          </p:cNvPr>
+          <p:cNvSpPr>
+            <a:spLocks noGrp="1"/>
+          </p:cNvSpPr>
+          <p:nvPr>
+            <p:ph type="subTitle" idx="1"/>
+          </p:nvPr>
+        </p:nvSpPr>
+        <p:spPr>
+          <a:xfrm>
+            <a:off x="6586186" y="3428999"/>
+            <a:ext cx="4805691" cy="838831"/>
+          </a:xfrm>
+        </p:spPr>
+        <p:txBody>
+          <a:bodyPr anchor="b">
+            <a:normAutofit/>
+          </a:bodyPr>
+          <a:lstStyle/>
+          <a:p>
+            <a:pPr algn="l"/>
+            <a:r>
+              <a:rPr lang="en-US" sz="1800">
+                <a:solidFill>
+                  <a:srgbClr val="000000"/>
+                </a:solidFill>
+              </a:rPr>
+              <a:t>Microservice – Stateless – Distributed Computing – Event Driven – Pluggable &amp; Performant</a:t>
+            </a:r>
+            <a:endParaRPr lang="en-US" sz="1800" dirty="0">
+              <a:solidFill>
+                <a:srgbClr val="000000"/>
+              </a:solidFill>
+            </a:endParaRPr>
+          </a:p>
+        </p:txBody>
+      </p:sp>
+      <p:sp>
+        <p:nvSpPr>
+          <p:cNvPr id="32" name="Freeform 49">
             <a:extLst>
               <a:ext uri="{FF2B5EF4-FFF2-40B4-BE49-F238E27FC236}">
                 <a16:creationId xmlns:a16="http://schemas.microsoft.com/office/drawing/2014/main" id="{77DA6D33-2D62-458C-BF5D-DBF612FD557E}"/>
@@ -4821,7 +4873,7 @@
         </p:nvSpPr>
         <p:spPr>
           <a:xfrm>
-            <a:off x="915457" y="6019799"/>
+            <a:off x="917044" y="5489097"/>
             <a:ext cx="1891243" cy="751417"/>
           </a:xfrm>
           <a:prstGeom prst="rect">
@@ -4910,6 +4962,53 @@
             <a:r>
               <a:rPr lang="en-US" dirty="0"/>
               <a:t>User related services</a:t>
+            </a:r>
+          </a:p>
+        </p:txBody>
+      </p:sp>
+      <p:sp>
+        <p:nvSpPr>
+          <p:cNvPr id="24" name="Rectangle 23">
+            <a:extLst>
+              <a:ext uri="{FF2B5EF4-FFF2-40B4-BE49-F238E27FC236}">
+                <a16:creationId xmlns:a16="http://schemas.microsoft.com/office/drawing/2014/main" id="{7FFF6509-B955-413B-A2BE-B4A938B8EA73}"/>
+              </a:ext>
+            </a:extLst>
+          </p:cNvPr>
+          <p:cNvSpPr/>
+          <p:nvPr/>
+        </p:nvSpPr>
+        <p:spPr>
+          <a:xfrm>
+            <a:off x="0" y="6334780"/>
+            <a:ext cx="3011337" cy="523220"/>
+          </a:xfrm>
+          <a:prstGeom prst="rect">
+            <a:avLst/>
+          </a:prstGeom>
+          <a:noFill/>
+        </p:spPr>
+        <p:txBody>
+          <a:bodyPr wrap="none" lIns="91440" tIns="45720" rIns="91440" bIns="45720">
+            <a:spAutoFit/>
+          </a:bodyPr>
+          <a:lstStyle/>
+          <a:p>
+            <a:r>
+              <a:rPr lang="en-US" sz="2800" b="0" cap="none" spc="0" dirty="0">
+                <a:ln w="0"/>
+                <a:solidFill>
+                  <a:schemeClr val="tx1"/>
+                </a:solidFill>
+                <a:effectLst>
+                  <a:outerShdw blurRad="38100" dist="19050" dir="2700000" algn="tl" rotWithShape="0">
+                    <a:schemeClr val="dk1">
+                      <a:alpha val="40000"/>
+                    </a:schemeClr>
+                  </a:outerShdw>
+                </a:effectLst>
+              </a:rPr>
+              <a:t>Global Architecture</a:t>
             </a:r>
           </a:p>
         </p:txBody>
@@ -5786,10 +5885,1393 @@
           </a:fontRef>
         </p:style>
       </p:cxnSp>
+      <p:sp>
+        <p:nvSpPr>
+          <p:cNvPr id="19" name="Rectangle 18">
+            <a:extLst>
+              <a:ext uri="{FF2B5EF4-FFF2-40B4-BE49-F238E27FC236}">
+                <a16:creationId xmlns:a16="http://schemas.microsoft.com/office/drawing/2014/main" id="{F42BD764-5384-4D15-A228-3BB05A7F9D0A}"/>
+              </a:ext>
+            </a:extLst>
+          </p:cNvPr>
+          <p:cNvSpPr/>
+          <p:nvPr/>
+        </p:nvSpPr>
+        <p:spPr>
+          <a:xfrm>
+            <a:off x="0" y="6334780"/>
+            <a:ext cx="4404026" cy="523220"/>
+          </a:xfrm>
+          <a:prstGeom prst="rect">
+            <a:avLst/>
+          </a:prstGeom>
+          <a:noFill/>
+        </p:spPr>
+        <p:txBody>
+          <a:bodyPr wrap="none" lIns="91440" tIns="45720" rIns="91440" bIns="45720">
+            <a:spAutoFit/>
+          </a:bodyPr>
+          <a:lstStyle/>
+          <a:p>
+            <a:r>
+              <a:rPr lang="en-US" sz="2800" b="0" cap="none" spc="0" dirty="0" err="1">
+                <a:ln w="0"/>
+                <a:solidFill>
+                  <a:schemeClr val="tx1"/>
+                </a:solidFill>
+                <a:effectLst>
+                  <a:outerShdw blurRad="38100" dist="19050" dir="2700000" algn="tl" rotWithShape="0">
+                    <a:schemeClr val="dk1">
+                      <a:alpha val="40000"/>
+                    </a:schemeClr>
+                  </a:outerShdw>
+                </a:effectLst>
+              </a:rPr>
+              <a:t>MultiService</a:t>
+            </a:r>
+            <a:r>
+              <a:rPr lang="en-US" sz="2800" b="0" cap="none" spc="0" dirty="0">
+                <a:ln w="0"/>
+                <a:solidFill>
+                  <a:schemeClr val="tx1"/>
+                </a:solidFill>
+                <a:effectLst>
+                  <a:outerShdw blurRad="38100" dist="19050" dir="2700000" algn="tl" rotWithShape="0">
+                    <a:schemeClr val="dk1">
+                      <a:alpha val="40000"/>
+                    </a:schemeClr>
+                  </a:outerShdw>
+                </a:effectLst>
+              </a:rPr>
+              <a:t> Communication</a:t>
+            </a:r>
+          </a:p>
+        </p:txBody>
+      </p:sp>
     </p:spTree>
     <p:extLst>
       <p:ext uri="{BB962C8B-B14F-4D97-AF65-F5344CB8AC3E}">
         <p14:creationId xmlns:p14="http://schemas.microsoft.com/office/powerpoint/2010/main" val="2101214389"/>
+      </p:ext>
+    </p:extLst>
+  </p:cSld>
+  <p:clrMapOvr>
+    <a:masterClrMapping/>
+  </p:clrMapOvr>
+</p:sld>
+</file>
+
+<file path=ppt/slides/slide4.xml><?xml version="1.0" encoding="utf-8"?>
+<p:sld xmlns:a="http://schemas.openxmlformats.org/drawingml/2006/main" xmlns:r="http://schemas.openxmlformats.org/officeDocument/2006/relationships" xmlns:p="http://schemas.openxmlformats.org/presentationml/2006/main">
+  <p:cSld>
+    <p:spTree>
+      <p:nvGrpSpPr>
+        <p:cNvPr id="1" name=""/>
+        <p:cNvGrpSpPr/>
+        <p:nvPr/>
+      </p:nvGrpSpPr>
+      <p:grpSpPr>
+        <a:xfrm>
+          <a:off x="0" y="0"/>
+          <a:ext cx="0" cy="0"/>
+          <a:chOff x="0" y="0"/>
+          <a:chExt cx="0" cy="0"/>
+        </a:xfrm>
+      </p:grpSpPr>
+      <p:sp>
+        <p:nvSpPr>
+          <p:cNvPr id="4" name="Rectangle 3">
+            <a:extLst>
+              <a:ext uri="{FF2B5EF4-FFF2-40B4-BE49-F238E27FC236}">
+                <a16:creationId xmlns:a16="http://schemas.microsoft.com/office/drawing/2014/main" id="{65ED6BFE-9B34-4DBF-BE4B-23C6BA02F32D}"/>
+              </a:ext>
+            </a:extLst>
+          </p:cNvPr>
+          <p:cNvSpPr/>
+          <p:nvPr/>
+        </p:nvSpPr>
+        <p:spPr>
+          <a:xfrm>
+            <a:off x="859873" y="2080468"/>
+            <a:ext cx="2265027" cy="1023457"/>
+          </a:xfrm>
+          <a:prstGeom prst="rect">
+            <a:avLst/>
+          </a:prstGeom>
+          <a:solidFill>
+            <a:schemeClr val="accent2">
+              <a:lumMod val="50000"/>
+            </a:schemeClr>
+          </a:solidFill>
+          <a:ln>
+            <a:solidFill>
+              <a:schemeClr val="accent2">
+                <a:lumMod val="50000"/>
+              </a:schemeClr>
+            </a:solidFill>
+          </a:ln>
+        </p:spPr>
+        <p:style>
+          <a:lnRef idx="2">
+            <a:schemeClr val="accent5">
+              <a:shade val="50000"/>
+            </a:schemeClr>
+          </a:lnRef>
+          <a:fillRef idx="1">
+            <a:schemeClr val="accent5"/>
+          </a:fillRef>
+          <a:effectRef idx="0">
+            <a:schemeClr val="accent5"/>
+          </a:effectRef>
+          <a:fontRef idx="minor">
+            <a:schemeClr val="lt1"/>
+          </a:fontRef>
+        </p:style>
+        <p:txBody>
+          <a:bodyPr rtlCol="0" anchor="ctr"/>
+          <a:lstStyle/>
+          <a:p>
+            <a:pPr algn="ctr"/>
+            <a:r>
+              <a:rPr lang="en-US" dirty="0" err="1"/>
+              <a:t>IIpcClient</a:t>
+            </a:r>
+            <a:endParaRPr lang="en-US" dirty="0"/>
+          </a:p>
+        </p:txBody>
+      </p:sp>
+      <p:sp>
+        <p:nvSpPr>
+          <p:cNvPr id="5" name="Rectangle 4">
+            <a:extLst>
+              <a:ext uri="{FF2B5EF4-FFF2-40B4-BE49-F238E27FC236}">
+                <a16:creationId xmlns:a16="http://schemas.microsoft.com/office/drawing/2014/main" id="{204CB5C0-8AE7-4202-A4EE-F8F96EEB13A0}"/>
+              </a:ext>
+            </a:extLst>
+          </p:cNvPr>
+          <p:cNvSpPr/>
+          <p:nvPr/>
+        </p:nvSpPr>
+        <p:spPr>
+          <a:xfrm>
+            <a:off x="9067100" y="2080469"/>
+            <a:ext cx="2265027" cy="1023457"/>
+          </a:xfrm>
+          <a:prstGeom prst="rect">
+            <a:avLst/>
+          </a:prstGeom>
+          <a:solidFill>
+            <a:schemeClr val="accent2">
+              <a:lumMod val="50000"/>
+            </a:schemeClr>
+          </a:solidFill>
+          <a:ln>
+            <a:solidFill>
+              <a:schemeClr val="accent2">
+                <a:lumMod val="50000"/>
+              </a:schemeClr>
+            </a:solidFill>
+          </a:ln>
+        </p:spPr>
+        <p:style>
+          <a:lnRef idx="2">
+            <a:schemeClr val="accent5">
+              <a:shade val="50000"/>
+            </a:schemeClr>
+          </a:lnRef>
+          <a:fillRef idx="1">
+            <a:schemeClr val="accent5"/>
+          </a:fillRef>
+          <a:effectRef idx="0">
+            <a:schemeClr val="accent5"/>
+          </a:effectRef>
+          <a:fontRef idx="minor">
+            <a:schemeClr val="lt1"/>
+          </a:fontRef>
+        </p:style>
+        <p:txBody>
+          <a:bodyPr rtlCol="0" anchor="ctr"/>
+          <a:lstStyle/>
+          <a:p>
+            <a:pPr algn="ctr"/>
+            <a:r>
+              <a:rPr lang="en-US" dirty="0" err="1"/>
+              <a:t>IIpcServer</a:t>
+            </a:r>
+            <a:endParaRPr lang="en-US" dirty="0"/>
+          </a:p>
+        </p:txBody>
+      </p:sp>
+      <p:sp>
+        <p:nvSpPr>
+          <p:cNvPr id="6" name="Rectangle 5">
+            <a:extLst>
+              <a:ext uri="{FF2B5EF4-FFF2-40B4-BE49-F238E27FC236}">
+                <a16:creationId xmlns:a16="http://schemas.microsoft.com/office/drawing/2014/main" id="{D2E4291D-7471-4EB1-8CFB-14A0152AAA35}"/>
+              </a:ext>
+            </a:extLst>
+          </p:cNvPr>
+          <p:cNvSpPr/>
+          <p:nvPr/>
+        </p:nvSpPr>
+        <p:spPr>
+          <a:xfrm>
+            <a:off x="4963483" y="1554760"/>
+            <a:ext cx="2265027" cy="378902"/>
+          </a:xfrm>
+          <a:prstGeom prst="rect">
+            <a:avLst/>
+          </a:prstGeom>
+          <a:solidFill>
+            <a:srgbClr val="7030A0"/>
+          </a:solidFill>
+        </p:spPr>
+        <p:style>
+          <a:lnRef idx="2">
+            <a:schemeClr val="accent1">
+              <a:shade val="50000"/>
+            </a:schemeClr>
+          </a:lnRef>
+          <a:fillRef idx="1">
+            <a:schemeClr val="accent1"/>
+          </a:fillRef>
+          <a:effectRef idx="0">
+            <a:schemeClr val="accent1"/>
+          </a:effectRef>
+          <a:fontRef idx="minor">
+            <a:schemeClr val="lt1"/>
+          </a:fontRef>
+        </p:style>
+        <p:txBody>
+          <a:bodyPr rtlCol="0" anchor="ctr"/>
+          <a:lstStyle/>
+          <a:p>
+            <a:pPr algn="ctr"/>
+            <a:r>
+              <a:rPr lang="en-US" dirty="0" err="1"/>
+              <a:t>IRouter</a:t>
+            </a:r>
+            <a:endParaRPr lang="en-US" dirty="0"/>
+          </a:p>
+        </p:txBody>
+      </p:sp>
+      <p:sp>
+        <p:nvSpPr>
+          <p:cNvPr id="9" name="Rectangle 8">
+            <a:extLst>
+              <a:ext uri="{FF2B5EF4-FFF2-40B4-BE49-F238E27FC236}">
+                <a16:creationId xmlns:a16="http://schemas.microsoft.com/office/drawing/2014/main" id="{A3B35A74-0A8F-4649-BE98-E4E328C28D7C}"/>
+              </a:ext>
+            </a:extLst>
+          </p:cNvPr>
+          <p:cNvSpPr/>
+          <p:nvPr/>
+        </p:nvSpPr>
+        <p:spPr>
+          <a:xfrm>
+            <a:off x="4963487" y="3103925"/>
+            <a:ext cx="2265027" cy="1023457"/>
+          </a:xfrm>
+          <a:prstGeom prst="rect">
+            <a:avLst/>
+          </a:prstGeom>
+        </p:spPr>
+        <p:style>
+          <a:lnRef idx="2">
+            <a:schemeClr val="accent1">
+              <a:shade val="50000"/>
+            </a:schemeClr>
+          </a:lnRef>
+          <a:fillRef idx="1">
+            <a:schemeClr val="accent1"/>
+          </a:fillRef>
+          <a:effectRef idx="0">
+            <a:schemeClr val="accent1"/>
+          </a:effectRef>
+          <a:fontRef idx="minor">
+            <a:schemeClr val="lt1"/>
+          </a:fontRef>
+        </p:style>
+        <p:txBody>
+          <a:bodyPr rtlCol="0" anchor="ctr"/>
+          <a:lstStyle/>
+          <a:p>
+            <a:pPr algn="ctr"/>
+            <a:r>
+              <a:rPr lang="en-US" dirty="0" err="1"/>
+              <a:t>IIpcPacket</a:t>
+            </a:r>
+            <a:endParaRPr lang="en-US" dirty="0"/>
+          </a:p>
+        </p:txBody>
+      </p:sp>
+      <p:sp>
+        <p:nvSpPr>
+          <p:cNvPr id="10" name="Rectangle 9">
+            <a:extLst>
+              <a:ext uri="{FF2B5EF4-FFF2-40B4-BE49-F238E27FC236}">
+                <a16:creationId xmlns:a16="http://schemas.microsoft.com/office/drawing/2014/main" id="{D033EB62-D9EC-4795-BFB8-642A027FACFB}"/>
+              </a:ext>
+            </a:extLst>
+          </p:cNvPr>
+          <p:cNvSpPr/>
+          <p:nvPr/>
+        </p:nvSpPr>
+        <p:spPr>
+          <a:xfrm>
+            <a:off x="4963488" y="4316835"/>
+            <a:ext cx="2265027" cy="1023457"/>
+          </a:xfrm>
+          <a:prstGeom prst="rect">
+            <a:avLst/>
+          </a:prstGeom>
+        </p:spPr>
+        <p:style>
+          <a:lnRef idx="2">
+            <a:schemeClr val="accent6">
+              <a:shade val="50000"/>
+            </a:schemeClr>
+          </a:lnRef>
+          <a:fillRef idx="1">
+            <a:schemeClr val="accent6"/>
+          </a:fillRef>
+          <a:effectRef idx="0">
+            <a:schemeClr val="accent6"/>
+          </a:effectRef>
+          <a:fontRef idx="minor">
+            <a:schemeClr val="lt1"/>
+          </a:fontRef>
+        </p:style>
+        <p:txBody>
+          <a:bodyPr rtlCol="0" anchor="ctr"/>
+          <a:lstStyle/>
+          <a:p>
+            <a:pPr algn="ctr"/>
+            <a:r>
+              <a:rPr lang="en-US" dirty="0" err="1"/>
+              <a:t>IIpcRequest</a:t>
+            </a:r>
+            <a:endParaRPr lang="en-US" dirty="0"/>
+          </a:p>
+        </p:txBody>
+      </p:sp>
+      <p:sp>
+        <p:nvSpPr>
+          <p:cNvPr id="11" name="Rectangle 10">
+            <a:extLst>
+              <a:ext uri="{FF2B5EF4-FFF2-40B4-BE49-F238E27FC236}">
+                <a16:creationId xmlns:a16="http://schemas.microsoft.com/office/drawing/2014/main" id="{71B90706-0A15-4C90-82A8-3A0B0D4A6E93}"/>
+              </a:ext>
+            </a:extLst>
+          </p:cNvPr>
+          <p:cNvSpPr/>
+          <p:nvPr/>
+        </p:nvSpPr>
+        <p:spPr>
+          <a:xfrm>
+            <a:off x="4963488" y="5472768"/>
+            <a:ext cx="2265027" cy="1023457"/>
+          </a:xfrm>
+          <a:prstGeom prst="rect">
+            <a:avLst/>
+          </a:prstGeom>
+        </p:spPr>
+        <p:style>
+          <a:lnRef idx="2">
+            <a:schemeClr val="accent2">
+              <a:shade val="50000"/>
+            </a:schemeClr>
+          </a:lnRef>
+          <a:fillRef idx="1">
+            <a:schemeClr val="accent2"/>
+          </a:fillRef>
+          <a:effectRef idx="0">
+            <a:schemeClr val="accent2"/>
+          </a:effectRef>
+          <a:fontRef idx="minor">
+            <a:schemeClr val="lt1"/>
+          </a:fontRef>
+        </p:style>
+        <p:txBody>
+          <a:bodyPr rtlCol="0" anchor="ctr"/>
+          <a:lstStyle/>
+          <a:p>
+            <a:pPr algn="ctr"/>
+            <a:r>
+              <a:rPr lang="en-US" dirty="0" err="1"/>
+              <a:t>IIpcResponse</a:t>
+            </a:r>
+            <a:endParaRPr lang="en-US" dirty="0"/>
+          </a:p>
+        </p:txBody>
+      </p:sp>
+      <p:sp>
+        <p:nvSpPr>
+          <p:cNvPr id="12" name="Rectangle 11">
+            <a:extLst>
+              <a:ext uri="{FF2B5EF4-FFF2-40B4-BE49-F238E27FC236}">
+                <a16:creationId xmlns:a16="http://schemas.microsoft.com/office/drawing/2014/main" id="{C3494C9D-580F-4763-BE21-5E5D27247DC5}"/>
+              </a:ext>
+            </a:extLst>
+          </p:cNvPr>
+          <p:cNvSpPr/>
+          <p:nvPr/>
+        </p:nvSpPr>
+        <p:spPr>
+          <a:xfrm>
+            <a:off x="10050012" y="4856876"/>
+            <a:ext cx="2041320" cy="483416"/>
+          </a:xfrm>
+          <a:prstGeom prst="rect">
+            <a:avLst/>
+          </a:prstGeom>
+        </p:spPr>
+        <p:style>
+          <a:lnRef idx="2">
+            <a:schemeClr val="accent6">
+              <a:shade val="50000"/>
+            </a:schemeClr>
+          </a:lnRef>
+          <a:fillRef idx="1">
+            <a:schemeClr val="accent6"/>
+          </a:fillRef>
+          <a:effectRef idx="0">
+            <a:schemeClr val="accent6"/>
+          </a:effectRef>
+          <a:fontRef idx="minor">
+            <a:schemeClr val="lt1"/>
+          </a:fontRef>
+        </p:style>
+        <p:txBody>
+          <a:bodyPr rtlCol="0" anchor="ctr"/>
+          <a:lstStyle/>
+          <a:p>
+            <a:pPr algn="ctr"/>
+            <a:r>
+              <a:rPr lang="en-US" dirty="0" err="1"/>
+              <a:t>IIpcRequestHandler</a:t>
+            </a:r>
+            <a:endParaRPr lang="en-US" dirty="0"/>
+          </a:p>
+        </p:txBody>
+      </p:sp>
+      <p:cxnSp>
+        <p:nvCxnSpPr>
+          <p:cNvPr id="15" name="Connector: Elbow 14">
+            <a:extLst>
+              <a:ext uri="{FF2B5EF4-FFF2-40B4-BE49-F238E27FC236}">
+                <a16:creationId xmlns:a16="http://schemas.microsoft.com/office/drawing/2014/main" id="{24BD15E7-93CC-42ED-B8F0-BD6283E2F70D}"/>
+              </a:ext>
+            </a:extLst>
+          </p:cNvPr>
+          <p:cNvCxnSpPr>
+            <a:cxnSpLocks/>
+            <a:stCxn id="4" idx="3"/>
+            <a:endCxn id="9" idx="1"/>
+          </p:cNvCxnSpPr>
+          <p:nvPr/>
+        </p:nvCxnSpPr>
+        <p:spPr>
+          <a:xfrm>
+            <a:off x="3124900" y="2592197"/>
+            <a:ext cx="1838587" cy="1023457"/>
+          </a:xfrm>
+          <a:prstGeom prst="bentConnector3">
+            <a:avLst/>
+          </a:prstGeom>
+          <a:ln w="19050">
+            <a:tailEnd type="triangle"/>
+          </a:ln>
+        </p:spPr>
+        <p:style>
+          <a:lnRef idx="1">
+            <a:schemeClr val="accent1"/>
+          </a:lnRef>
+          <a:fillRef idx="0">
+            <a:schemeClr val="accent1"/>
+          </a:fillRef>
+          <a:effectRef idx="0">
+            <a:schemeClr val="accent1"/>
+          </a:effectRef>
+          <a:fontRef idx="minor">
+            <a:schemeClr val="tx1"/>
+          </a:fontRef>
+        </p:style>
+      </p:cxnSp>
+      <p:cxnSp>
+        <p:nvCxnSpPr>
+          <p:cNvPr id="26" name="Connector: Elbow 25">
+            <a:extLst>
+              <a:ext uri="{FF2B5EF4-FFF2-40B4-BE49-F238E27FC236}">
+                <a16:creationId xmlns:a16="http://schemas.microsoft.com/office/drawing/2014/main" id="{11C23860-EC7F-4951-8EDE-F99A877E5164}"/>
+              </a:ext>
+            </a:extLst>
+          </p:cNvPr>
+          <p:cNvCxnSpPr>
+            <a:cxnSpLocks/>
+            <a:stCxn id="4" idx="3"/>
+            <a:endCxn id="10" idx="1"/>
+          </p:cNvCxnSpPr>
+          <p:nvPr/>
+        </p:nvCxnSpPr>
+        <p:spPr>
+          <a:xfrm>
+            <a:off x="3124900" y="2592197"/>
+            <a:ext cx="1838588" cy="2236367"/>
+          </a:xfrm>
+          <a:prstGeom prst="bentConnector3">
+            <a:avLst>
+              <a:gd name="adj1" fmla="val 50000"/>
+            </a:avLst>
+          </a:prstGeom>
+          <a:ln w="19050">
+            <a:tailEnd type="triangle"/>
+          </a:ln>
+        </p:spPr>
+        <p:style>
+          <a:lnRef idx="1">
+            <a:schemeClr val="accent6"/>
+          </a:lnRef>
+          <a:fillRef idx="0">
+            <a:schemeClr val="accent6"/>
+          </a:fillRef>
+          <a:effectRef idx="0">
+            <a:schemeClr val="accent6"/>
+          </a:effectRef>
+          <a:fontRef idx="minor">
+            <a:schemeClr val="tx1"/>
+          </a:fontRef>
+        </p:style>
+      </p:cxnSp>
+      <p:cxnSp>
+        <p:nvCxnSpPr>
+          <p:cNvPr id="29" name="Connector: Elbow 28">
+            <a:extLst>
+              <a:ext uri="{FF2B5EF4-FFF2-40B4-BE49-F238E27FC236}">
+                <a16:creationId xmlns:a16="http://schemas.microsoft.com/office/drawing/2014/main" id="{6A20D76A-9B5B-4465-9E72-BAB11E5CC6FA}"/>
+              </a:ext>
+            </a:extLst>
+          </p:cNvPr>
+          <p:cNvCxnSpPr>
+            <a:cxnSpLocks/>
+            <a:stCxn id="5" idx="2"/>
+            <a:endCxn id="12" idx="0"/>
+          </p:cNvCxnSpPr>
+          <p:nvPr/>
+        </p:nvCxnSpPr>
+        <p:spPr>
+          <a:xfrm rot="16200000" flipH="1">
+            <a:off x="9758668" y="3544872"/>
+            <a:ext cx="1752950" cy="871058"/>
+          </a:xfrm>
+          <a:prstGeom prst="bentConnector3">
+            <a:avLst>
+              <a:gd name="adj1" fmla="val 50000"/>
+            </a:avLst>
+          </a:prstGeom>
+          <a:ln w="19050">
+            <a:tailEnd type="triangle"/>
+          </a:ln>
+        </p:spPr>
+        <p:style>
+          <a:lnRef idx="1">
+            <a:schemeClr val="accent6"/>
+          </a:lnRef>
+          <a:fillRef idx="0">
+            <a:schemeClr val="accent6"/>
+          </a:fillRef>
+          <a:effectRef idx="0">
+            <a:schemeClr val="accent6"/>
+          </a:effectRef>
+          <a:fontRef idx="minor">
+            <a:schemeClr val="tx1"/>
+          </a:fontRef>
+        </p:style>
+      </p:cxnSp>
+      <p:cxnSp>
+        <p:nvCxnSpPr>
+          <p:cNvPr id="46" name="Connector: Elbow 45">
+            <a:extLst>
+              <a:ext uri="{FF2B5EF4-FFF2-40B4-BE49-F238E27FC236}">
+                <a16:creationId xmlns:a16="http://schemas.microsoft.com/office/drawing/2014/main" id="{D9E77508-F126-43AB-B770-EFA4C4FC1A55}"/>
+              </a:ext>
+            </a:extLst>
+          </p:cNvPr>
+          <p:cNvCxnSpPr>
+            <a:cxnSpLocks/>
+            <a:stCxn id="12" idx="1"/>
+            <a:endCxn id="11" idx="2"/>
+          </p:cNvCxnSpPr>
+          <p:nvPr/>
+        </p:nvCxnSpPr>
+        <p:spPr>
+          <a:xfrm rot="10800000" flipV="1">
+            <a:off x="6096002" y="5098583"/>
+            <a:ext cx="3954010" cy="1397641"/>
+          </a:xfrm>
+          <a:prstGeom prst="bentConnector4">
+            <a:avLst>
+              <a:gd name="adj1" fmla="val 35679"/>
+              <a:gd name="adj2" fmla="val 116356"/>
+            </a:avLst>
+          </a:prstGeom>
+          <a:ln w="19050">
+            <a:tailEnd type="triangle"/>
+          </a:ln>
+        </p:spPr>
+        <p:style>
+          <a:lnRef idx="1">
+            <a:schemeClr val="accent2"/>
+          </a:lnRef>
+          <a:fillRef idx="0">
+            <a:schemeClr val="accent2"/>
+          </a:fillRef>
+          <a:effectRef idx="0">
+            <a:schemeClr val="accent2"/>
+          </a:effectRef>
+          <a:fontRef idx="minor">
+            <a:schemeClr val="tx1"/>
+          </a:fontRef>
+        </p:style>
+      </p:cxnSp>
+      <p:sp>
+        <p:nvSpPr>
+          <p:cNvPr id="49" name="Rectangle 48">
+            <a:extLst>
+              <a:ext uri="{FF2B5EF4-FFF2-40B4-BE49-F238E27FC236}">
+                <a16:creationId xmlns:a16="http://schemas.microsoft.com/office/drawing/2014/main" id="{BFC0E9FB-3033-45EB-ACCF-E84E457F0EA6}"/>
+              </a:ext>
+            </a:extLst>
+          </p:cNvPr>
+          <p:cNvSpPr/>
+          <p:nvPr/>
+        </p:nvSpPr>
+        <p:spPr>
+          <a:xfrm>
+            <a:off x="4963485" y="92977"/>
+            <a:ext cx="2265027" cy="1023457"/>
+          </a:xfrm>
+          <a:prstGeom prst="rect">
+            <a:avLst/>
+          </a:prstGeom>
+          <a:solidFill>
+            <a:srgbClr val="7030A0"/>
+          </a:solidFill>
+        </p:spPr>
+        <p:style>
+          <a:lnRef idx="2">
+            <a:schemeClr val="accent1">
+              <a:shade val="50000"/>
+            </a:schemeClr>
+          </a:lnRef>
+          <a:fillRef idx="1">
+            <a:schemeClr val="accent1"/>
+          </a:fillRef>
+          <a:effectRef idx="0">
+            <a:schemeClr val="accent1"/>
+          </a:effectRef>
+          <a:fontRef idx="minor">
+            <a:schemeClr val="lt1"/>
+          </a:fontRef>
+        </p:style>
+        <p:txBody>
+          <a:bodyPr rtlCol="0" anchor="ctr"/>
+          <a:lstStyle/>
+          <a:p>
+            <a:pPr algn="ctr"/>
+            <a:r>
+              <a:rPr lang="en-US" dirty="0" err="1"/>
+              <a:t>MessageBroker</a:t>
+            </a:r>
+            <a:endParaRPr lang="en-US" dirty="0"/>
+          </a:p>
+        </p:txBody>
+      </p:sp>
+      <p:cxnSp>
+        <p:nvCxnSpPr>
+          <p:cNvPr id="50" name="Connector: Elbow 49">
+            <a:extLst>
+              <a:ext uri="{FF2B5EF4-FFF2-40B4-BE49-F238E27FC236}">
+                <a16:creationId xmlns:a16="http://schemas.microsoft.com/office/drawing/2014/main" id="{78F6BA25-BB88-46A1-B9F7-FC4490E4AD33}"/>
+              </a:ext>
+            </a:extLst>
+          </p:cNvPr>
+          <p:cNvCxnSpPr>
+            <a:cxnSpLocks/>
+            <a:stCxn id="9" idx="0"/>
+            <a:endCxn id="65" idx="2"/>
+          </p:cNvCxnSpPr>
+          <p:nvPr/>
+        </p:nvCxnSpPr>
+        <p:spPr>
+          <a:xfrm rot="16200000" flipV="1">
+            <a:off x="5898161" y="2906084"/>
+            <a:ext cx="395679" cy="3"/>
+          </a:xfrm>
+          <a:prstGeom prst="bentConnector3">
+            <a:avLst>
+              <a:gd name="adj1" fmla="val 50000"/>
+            </a:avLst>
+          </a:prstGeom>
+          <a:ln w="19050">
+            <a:tailEnd type="triangle"/>
+          </a:ln>
+        </p:spPr>
+        <p:style>
+          <a:lnRef idx="1">
+            <a:schemeClr val="accent1"/>
+          </a:lnRef>
+          <a:fillRef idx="0">
+            <a:schemeClr val="accent1"/>
+          </a:fillRef>
+          <a:effectRef idx="0">
+            <a:schemeClr val="accent1"/>
+          </a:effectRef>
+          <a:fontRef idx="minor">
+            <a:schemeClr val="tx1"/>
+          </a:fontRef>
+        </p:style>
+      </p:cxnSp>
+      <p:cxnSp>
+        <p:nvCxnSpPr>
+          <p:cNvPr id="56" name="Connector: Elbow 55">
+            <a:extLst>
+              <a:ext uri="{FF2B5EF4-FFF2-40B4-BE49-F238E27FC236}">
+                <a16:creationId xmlns:a16="http://schemas.microsoft.com/office/drawing/2014/main" id="{9180233E-DD6E-4617-A3CC-8E826F439059}"/>
+              </a:ext>
+            </a:extLst>
+          </p:cNvPr>
+          <p:cNvCxnSpPr>
+            <a:cxnSpLocks/>
+            <a:stCxn id="6" idx="0"/>
+            <a:endCxn id="49" idx="2"/>
+          </p:cNvCxnSpPr>
+          <p:nvPr/>
+        </p:nvCxnSpPr>
+        <p:spPr>
+          <a:xfrm rot="5400000" flipH="1" flipV="1">
+            <a:off x="5876835" y="1335596"/>
+            <a:ext cx="438326" cy="2"/>
+          </a:xfrm>
+          <a:prstGeom prst="bentConnector3">
+            <a:avLst>
+              <a:gd name="adj1" fmla="val 50000"/>
+            </a:avLst>
+          </a:prstGeom>
+          <a:ln w="19050">
+            <a:tailEnd type="triangle"/>
+          </a:ln>
+        </p:spPr>
+        <p:style>
+          <a:lnRef idx="1">
+            <a:schemeClr val="accent1"/>
+          </a:lnRef>
+          <a:fillRef idx="0">
+            <a:schemeClr val="accent1"/>
+          </a:fillRef>
+          <a:effectRef idx="0">
+            <a:schemeClr val="accent1"/>
+          </a:effectRef>
+          <a:fontRef idx="minor">
+            <a:schemeClr val="tx1"/>
+          </a:fontRef>
+        </p:style>
+      </p:cxnSp>
+      <p:cxnSp>
+        <p:nvCxnSpPr>
+          <p:cNvPr id="59" name="Connector: Elbow 58">
+            <a:extLst>
+              <a:ext uri="{FF2B5EF4-FFF2-40B4-BE49-F238E27FC236}">
+                <a16:creationId xmlns:a16="http://schemas.microsoft.com/office/drawing/2014/main" id="{7843FB08-BC6C-4CD5-BE9A-6DD168C44758}"/>
+              </a:ext>
+            </a:extLst>
+          </p:cNvPr>
+          <p:cNvCxnSpPr>
+            <a:cxnSpLocks/>
+            <a:stCxn id="49" idx="3"/>
+            <a:endCxn id="5" idx="0"/>
+          </p:cNvCxnSpPr>
+          <p:nvPr/>
+        </p:nvCxnSpPr>
+        <p:spPr>
+          <a:xfrm>
+            <a:off x="7228512" y="604706"/>
+            <a:ext cx="2971102" cy="1475763"/>
+          </a:xfrm>
+          <a:prstGeom prst="bentConnector2">
+            <a:avLst/>
+          </a:prstGeom>
+          <a:ln w="19050">
+            <a:tailEnd type="triangle"/>
+          </a:ln>
+        </p:spPr>
+        <p:style>
+          <a:lnRef idx="1">
+            <a:schemeClr val="accent6"/>
+          </a:lnRef>
+          <a:fillRef idx="0">
+            <a:schemeClr val="accent6"/>
+          </a:fillRef>
+          <a:effectRef idx="0">
+            <a:schemeClr val="accent6"/>
+          </a:effectRef>
+          <a:fontRef idx="minor">
+            <a:schemeClr val="tx1"/>
+          </a:fontRef>
+        </p:style>
+      </p:cxnSp>
+      <p:sp>
+        <p:nvSpPr>
+          <p:cNvPr id="65" name="Rectangle 64">
+            <a:extLst>
+              <a:ext uri="{FF2B5EF4-FFF2-40B4-BE49-F238E27FC236}">
+                <a16:creationId xmlns:a16="http://schemas.microsoft.com/office/drawing/2014/main" id="{E58C61CB-22A8-4C0D-A69A-DF472D46639D}"/>
+              </a:ext>
+            </a:extLst>
+          </p:cNvPr>
+          <p:cNvSpPr/>
+          <p:nvPr/>
+        </p:nvSpPr>
+        <p:spPr>
+          <a:xfrm>
+            <a:off x="4963484" y="2329344"/>
+            <a:ext cx="2265027" cy="378902"/>
+          </a:xfrm>
+          <a:prstGeom prst="rect">
+            <a:avLst/>
+          </a:prstGeom>
+          <a:solidFill>
+            <a:srgbClr val="7030A0"/>
+          </a:solidFill>
+        </p:spPr>
+        <p:style>
+          <a:lnRef idx="2">
+            <a:schemeClr val="accent1">
+              <a:shade val="50000"/>
+            </a:schemeClr>
+          </a:lnRef>
+          <a:fillRef idx="1">
+            <a:schemeClr val="accent1"/>
+          </a:fillRef>
+          <a:effectRef idx="0">
+            <a:schemeClr val="accent1"/>
+          </a:effectRef>
+          <a:fontRef idx="minor">
+            <a:schemeClr val="lt1"/>
+          </a:fontRef>
+        </p:style>
+        <p:txBody>
+          <a:bodyPr rtlCol="0" anchor="ctr"/>
+          <a:lstStyle/>
+          <a:p>
+            <a:pPr algn="ctr"/>
+            <a:r>
+              <a:rPr lang="en-US" dirty="0" err="1"/>
+              <a:t>ISerializer</a:t>
+            </a:r>
+            <a:endParaRPr lang="en-US" dirty="0"/>
+          </a:p>
+        </p:txBody>
+      </p:sp>
+      <p:cxnSp>
+        <p:nvCxnSpPr>
+          <p:cNvPr id="72" name="Connector: Elbow 71">
+            <a:extLst>
+              <a:ext uri="{FF2B5EF4-FFF2-40B4-BE49-F238E27FC236}">
+                <a16:creationId xmlns:a16="http://schemas.microsoft.com/office/drawing/2014/main" id="{08B29643-90B9-4F51-B943-10548C19FC1E}"/>
+              </a:ext>
+            </a:extLst>
+          </p:cNvPr>
+          <p:cNvCxnSpPr>
+            <a:cxnSpLocks/>
+            <a:stCxn id="65" idx="0"/>
+            <a:endCxn id="6" idx="2"/>
+          </p:cNvCxnSpPr>
+          <p:nvPr/>
+        </p:nvCxnSpPr>
+        <p:spPr>
+          <a:xfrm rot="16200000" flipV="1">
+            <a:off x="5898157" y="2131502"/>
+            <a:ext cx="395682" cy="1"/>
+          </a:xfrm>
+          <a:prstGeom prst="bentConnector3">
+            <a:avLst>
+              <a:gd name="adj1" fmla="val 50000"/>
+            </a:avLst>
+          </a:prstGeom>
+          <a:ln w="19050">
+            <a:tailEnd type="triangle"/>
+          </a:ln>
+        </p:spPr>
+        <p:style>
+          <a:lnRef idx="1">
+            <a:schemeClr val="accent1"/>
+          </a:lnRef>
+          <a:fillRef idx="0">
+            <a:schemeClr val="accent1"/>
+          </a:fillRef>
+          <a:effectRef idx="0">
+            <a:schemeClr val="accent1"/>
+          </a:effectRef>
+          <a:fontRef idx="minor">
+            <a:schemeClr val="tx1"/>
+          </a:fontRef>
+        </p:style>
+      </p:cxnSp>
+      <p:cxnSp>
+        <p:nvCxnSpPr>
+          <p:cNvPr id="76" name="Connector: Elbow 75">
+            <a:extLst>
+              <a:ext uri="{FF2B5EF4-FFF2-40B4-BE49-F238E27FC236}">
+                <a16:creationId xmlns:a16="http://schemas.microsoft.com/office/drawing/2014/main" id="{9DAF4FA5-CF28-409F-95D1-45A15E1AD93D}"/>
+              </a:ext>
+            </a:extLst>
+          </p:cNvPr>
+          <p:cNvCxnSpPr>
+            <a:cxnSpLocks/>
+            <a:stCxn id="11" idx="3"/>
+            <a:endCxn id="65" idx="3"/>
+          </p:cNvCxnSpPr>
+          <p:nvPr/>
+        </p:nvCxnSpPr>
+        <p:spPr>
+          <a:xfrm flipH="1" flipV="1">
+            <a:off x="7228511" y="2518795"/>
+            <a:ext cx="4" cy="3465702"/>
+          </a:xfrm>
+          <a:prstGeom prst="bentConnector3">
+            <a:avLst>
+              <a:gd name="adj1" fmla="val -5715000000"/>
+            </a:avLst>
+          </a:prstGeom>
+          <a:ln w="19050">
+            <a:tailEnd type="triangle"/>
+          </a:ln>
+        </p:spPr>
+        <p:style>
+          <a:lnRef idx="1">
+            <a:schemeClr val="accent2"/>
+          </a:lnRef>
+          <a:fillRef idx="0">
+            <a:schemeClr val="accent2"/>
+          </a:fillRef>
+          <a:effectRef idx="0">
+            <a:schemeClr val="accent2"/>
+          </a:effectRef>
+          <a:fontRef idx="minor">
+            <a:schemeClr val="tx1"/>
+          </a:fontRef>
+        </p:style>
+      </p:cxnSp>
+      <p:cxnSp>
+        <p:nvCxnSpPr>
+          <p:cNvPr id="90" name="Connector: Elbow 89">
+            <a:extLst>
+              <a:ext uri="{FF2B5EF4-FFF2-40B4-BE49-F238E27FC236}">
+                <a16:creationId xmlns:a16="http://schemas.microsoft.com/office/drawing/2014/main" id="{02FBFC13-3E34-4DAB-8B02-5E672BBD17BB}"/>
+              </a:ext>
+            </a:extLst>
+          </p:cNvPr>
+          <p:cNvCxnSpPr>
+            <a:cxnSpLocks/>
+            <a:stCxn id="49" idx="1"/>
+            <a:endCxn id="4" idx="0"/>
+          </p:cNvCxnSpPr>
+          <p:nvPr/>
+        </p:nvCxnSpPr>
+        <p:spPr>
+          <a:xfrm rot="10800000" flipV="1">
+            <a:off x="1992387" y="604706"/>
+            <a:ext cx="2971098" cy="1475762"/>
+          </a:xfrm>
+          <a:prstGeom prst="bentConnector2">
+            <a:avLst/>
+          </a:prstGeom>
+          <a:ln w="19050">
+            <a:tailEnd type="triangle"/>
+          </a:ln>
+        </p:spPr>
+        <p:style>
+          <a:lnRef idx="1">
+            <a:schemeClr val="accent2"/>
+          </a:lnRef>
+          <a:fillRef idx="0">
+            <a:schemeClr val="accent2"/>
+          </a:fillRef>
+          <a:effectRef idx="0">
+            <a:schemeClr val="accent2"/>
+          </a:effectRef>
+          <a:fontRef idx="minor">
+            <a:schemeClr val="tx1"/>
+          </a:fontRef>
+        </p:style>
+      </p:cxnSp>
+      <p:cxnSp>
+        <p:nvCxnSpPr>
+          <p:cNvPr id="93" name="Connector: Elbow 92">
+            <a:extLst>
+              <a:ext uri="{FF2B5EF4-FFF2-40B4-BE49-F238E27FC236}">
+                <a16:creationId xmlns:a16="http://schemas.microsoft.com/office/drawing/2014/main" id="{72D0470F-83C8-478D-97BD-158745DAD11F}"/>
+              </a:ext>
+            </a:extLst>
+          </p:cNvPr>
+          <p:cNvCxnSpPr>
+            <a:cxnSpLocks/>
+          </p:cNvCxnSpPr>
+          <p:nvPr/>
+        </p:nvCxnSpPr>
+        <p:spPr>
+          <a:xfrm rot="5400000" flipH="1" flipV="1">
+            <a:off x="6054754" y="1974902"/>
+            <a:ext cx="370512" cy="288029"/>
+          </a:xfrm>
+          <a:prstGeom prst="bentConnector3">
+            <a:avLst>
+              <a:gd name="adj1" fmla="val 45471"/>
+            </a:avLst>
+          </a:prstGeom>
+          <a:ln w="19050">
+            <a:tailEnd type="triangle"/>
+          </a:ln>
+        </p:spPr>
+        <p:style>
+          <a:lnRef idx="1">
+            <a:schemeClr val="accent6"/>
+          </a:lnRef>
+          <a:fillRef idx="0">
+            <a:schemeClr val="accent6"/>
+          </a:fillRef>
+          <a:effectRef idx="0">
+            <a:schemeClr val="accent6"/>
+          </a:effectRef>
+          <a:fontRef idx="minor">
+            <a:schemeClr val="tx1"/>
+          </a:fontRef>
+        </p:style>
+      </p:cxnSp>
+      <p:cxnSp>
+        <p:nvCxnSpPr>
+          <p:cNvPr id="97" name="Connector: Elbow 96">
+            <a:extLst>
+              <a:ext uri="{FF2B5EF4-FFF2-40B4-BE49-F238E27FC236}">
+                <a16:creationId xmlns:a16="http://schemas.microsoft.com/office/drawing/2014/main" id="{195F567D-9FAC-4E4A-90D4-15888B10CBA4}"/>
+              </a:ext>
+            </a:extLst>
+          </p:cNvPr>
+          <p:cNvCxnSpPr>
+            <a:cxnSpLocks/>
+            <a:stCxn id="6" idx="0"/>
+          </p:cNvCxnSpPr>
+          <p:nvPr/>
+        </p:nvCxnSpPr>
+        <p:spPr>
+          <a:xfrm rot="5400000" flipH="1" flipV="1">
+            <a:off x="6091455" y="1120976"/>
+            <a:ext cx="438327" cy="429243"/>
+          </a:xfrm>
+          <a:prstGeom prst="bentConnector3">
+            <a:avLst>
+              <a:gd name="adj1" fmla="val 50000"/>
+            </a:avLst>
+          </a:prstGeom>
+          <a:ln w="19050">
+            <a:tailEnd type="triangle"/>
+          </a:ln>
+        </p:spPr>
+        <p:style>
+          <a:lnRef idx="1">
+            <a:schemeClr val="accent6"/>
+          </a:lnRef>
+          <a:fillRef idx="0">
+            <a:schemeClr val="accent6"/>
+          </a:fillRef>
+          <a:effectRef idx="0">
+            <a:schemeClr val="accent6"/>
+          </a:effectRef>
+          <a:fontRef idx="minor">
+            <a:schemeClr val="tx1"/>
+          </a:fontRef>
+        </p:style>
+      </p:cxnSp>
+      <p:cxnSp>
+        <p:nvCxnSpPr>
+          <p:cNvPr id="104" name="Connector: Elbow 103">
+            <a:extLst>
+              <a:ext uri="{FF2B5EF4-FFF2-40B4-BE49-F238E27FC236}">
+                <a16:creationId xmlns:a16="http://schemas.microsoft.com/office/drawing/2014/main" id="{FF272A95-B5C5-4281-834B-C25E13ACB1EE}"/>
+              </a:ext>
+            </a:extLst>
+          </p:cNvPr>
+          <p:cNvCxnSpPr>
+            <a:cxnSpLocks/>
+            <a:stCxn id="65" idx="0"/>
+          </p:cNvCxnSpPr>
+          <p:nvPr/>
+        </p:nvCxnSpPr>
+        <p:spPr>
+          <a:xfrm rot="16200000" flipV="1">
+            <a:off x="5754143" y="1987489"/>
+            <a:ext cx="395685" cy="288026"/>
+          </a:xfrm>
+          <a:prstGeom prst="bentConnector3">
+            <a:avLst>
+              <a:gd name="adj1" fmla="val 48796"/>
+            </a:avLst>
+          </a:prstGeom>
+          <a:ln w="19050">
+            <a:tailEnd type="triangle"/>
+          </a:ln>
+        </p:spPr>
+        <p:style>
+          <a:lnRef idx="1">
+            <a:schemeClr val="accent2"/>
+          </a:lnRef>
+          <a:fillRef idx="0">
+            <a:schemeClr val="accent2"/>
+          </a:fillRef>
+          <a:effectRef idx="0">
+            <a:schemeClr val="accent2"/>
+          </a:effectRef>
+          <a:fontRef idx="minor">
+            <a:schemeClr val="tx1"/>
+          </a:fontRef>
+        </p:style>
+      </p:cxnSp>
+      <p:cxnSp>
+        <p:nvCxnSpPr>
+          <p:cNvPr id="109" name="Connector: Elbow 108">
+            <a:extLst>
+              <a:ext uri="{FF2B5EF4-FFF2-40B4-BE49-F238E27FC236}">
+                <a16:creationId xmlns:a16="http://schemas.microsoft.com/office/drawing/2014/main" id="{C7186F2D-E064-4506-8C19-7951E8026597}"/>
+              </a:ext>
+            </a:extLst>
+          </p:cNvPr>
+          <p:cNvCxnSpPr>
+            <a:cxnSpLocks/>
+            <a:stCxn id="6" idx="0"/>
+          </p:cNvCxnSpPr>
+          <p:nvPr/>
+        </p:nvCxnSpPr>
+        <p:spPr>
+          <a:xfrm rot="16200000" flipV="1">
+            <a:off x="5661255" y="1120017"/>
+            <a:ext cx="440245" cy="429241"/>
+          </a:xfrm>
+          <a:prstGeom prst="bentConnector3">
+            <a:avLst>
+              <a:gd name="adj1" fmla="val 50000"/>
+            </a:avLst>
+          </a:prstGeom>
+          <a:ln w="19050">
+            <a:tailEnd type="triangle"/>
+          </a:ln>
+        </p:spPr>
+        <p:style>
+          <a:lnRef idx="1">
+            <a:schemeClr val="accent2"/>
+          </a:lnRef>
+          <a:fillRef idx="0">
+            <a:schemeClr val="accent2"/>
+          </a:fillRef>
+          <a:effectRef idx="0">
+            <a:schemeClr val="accent2"/>
+          </a:effectRef>
+          <a:fontRef idx="minor">
+            <a:schemeClr val="tx1"/>
+          </a:fontRef>
+        </p:style>
+      </p:cxnSp>
+      <p:sp>
+        <p:nvSpPr>
+          <p:cNvPr id="116" name="Rectangle 115">
+            <a:extLst>
+              <a:ext uri="{FF2B5EF4-FFF2-40B4-BE49-F238E27FC236}">
+                <a16:creationId xmlns:a16="http://schemas.microsoft.com/office/drawing/2014/main" id="{57BA946B-BEBF-4B3D-9CF6-0A091915543F}"/>
+              </a:ext>
+            </a:extLst>
+          </p:cNvPr>
+          <p:cNvSpPr/>
+          <p:nvPr/>
+        </p:nvSpPr>
+        <p:spPr>
+          <a:xfrm>
+            <a:off x="7743050" y="4345146"/>
+            <a:ext cx="2195109" cy="483417"/>
+          </a:xfrm>
+          <a:prstGeom prst="rect">
+            <a:avLst/>
+          </a:prstGeom>
+        </p:spPr>
+        <p:style>
+          <a:lnRef idx="2">
+            <a:schemeClr val="accent1">
+              <a:shade val="50000"/>
+            </a:schemeClr>
+          </a:lnRef>
+          <a:fillRef idx="1">
+            <a:schemeClr val="accent1"/>
+          </a:fillRef>
+          <a:effectRef idx="0">
+            <a:schemeClr val="accent1"/>
+          </a:effectRef>
+          <a:fontRef idx="minor">
+            <a:schemeClr val="lt1"/>
+          </a:fontRef>
+        </p:style>
+        <p:txBody>
+          <a:bodyPr rtlCol="0" anchor="ctr"/>
+          <a:lstStyle/>
+          <a:p>
+            <a:pPr algn="ctr"/>
+            <a:r>
+              <a:rPr lang="en-US" dirty="0" err="1"/>
+              <a:t>IIpcPacketHandler</a:t>
+            </a:r>
+            <a:endParaRPr lang="en-US" dirty="0"/>
+          </a:p>
+        </p:txBody>
+      </p:sp>
+      <p:cxnSp>
+        <p:nvCxnSpPr>
+          <p:cNvPr id="125" name="Connector: Elbow 124">
+            <a:extLst>
+              <a:ext uri="{FF2B5EF4-FFF2-40B4-BE49-F238E27FC236}">
+                <a16:creationId xmlns:a16="http://schemas.microsoft.com/office/drawing/2014/main" id="{421572F1-9122-4712-8538-868C8809EB25}"/>
+              </a:ext>
+            </a:extLst>
+          </p:cNvPr>
+          <p:cNvCxnSpPr>
+            <a:cxnSpLocks/>
+            <a:stCxn id="49" idx="3"/>
+            <a:endCxn id="5" idx="1"/>
+          </p:cNvCxnSpPr>
+          <p:nvPr/>
+        </p:nvCxnSpPr>
+        <p:spPr>
+          <a:xfrm>
+            <a:off x="7228512" y="604706"/>
+            <a:ext cx="1838588" cy="1987492"/>
+          </a:xfrm>
+          <a:prstGeom prst="bentConnector3">
+            <a:avLst>
+              <a:gd name="adj1" fmla="val 50000"/>
+            </a:avLst>
+          </a:prstGeom>
+          <a:ln w="19050">
+            <a:tailEnd type="triangle"/>
+          </a:ln>
+        </p:spPr>
+        <p:style>
+          <a:lnRef idx="1">
+            <a:schemeClr val="accent1"/>
+          </a:lnRef>
+          <a:fillRef idx="0">
+            <a:schemeClr val="accent1"/>
+          </a:fillRef>
+          <a:effectRef idx="0">
+            <a:schemeClr val="accent1"/>
+          </a:effectRef>
+          <a:fontRef idx="minor">
+            <a:schemeClr val="tx1"/>
+          </a:fontRef>
+        </p:style>
+      </p:cxnSp>
+      <p:cxnSp>
+        <p:nvCxnSpPr>
+          <p:cNvPr id="131" name="Connector: Elbow 130">
+            <a:extLst>
+              <a:ext uri="{FF2B5EF4-FFF2-40B4-BE49-F238E27FC236}">
+                <a16:creationId xmlns:a16="http://schemas.microsoft.com/office/drawing/2014/main" id="{60DDABC0-DA08-44C6-81C5-75A1B4BE7971}"/>
+              </a:ext>
+            </a:extLst>
+          </p:cNvPr>
+          <p:cNvCxnSpPr>
+            <a:cxnSpLocks/>
+            <a:stCxn id="5" idx="2"/>
+            <a:endCxn id="116" idx="0"/>
+          </p:cNvCxnSpPr>
+          <p:nvPr/>
+        </p:nvCxnSpPr>
+        <p:spPr>
+          <a:xfrm rot="5400000">
+            <a:off x="8899500" y="3045032"/>
+            <a:ext cx="1241220" cy="1359009"/>
+          </a:xfrm>
+          <a:prstGeom prst="bentConnector3">
+            <a:avLst>
+              <a:gd name="adj1" fmla="val 50000"/>
+            </a:avLst>
+          </a:prstGeom>
+          <a:ln w="19050">
+            <a:tailEnd type="triangle"/>
+          </a:ln>
+        </p:spPr>
+        <p:style>
+          <a:lnRef idx="1">
+            <a:schemeClr val="accent1"/>
+          </a:lnRef>
+          <a:fillRef idx="0">
+            <a:schemeClr val="accent1"/>
+          </a:fillRef>
+          <a:effectRef idx="0">
+            <a:schemeClr val="accent1"/>
+          </a:effectRef>
+          <a:fontRef idx="minor">
+            <a:schemeClr val="tx1"/>
+          </a:fontRef>
+        </p:style>
+      </p:cxnSp>
+      <p:sp>
+        <p:nvSpPr>
+          <p:cNvPr id="134" name="Rectangle 133">
+            <a:extLst>
+              <a:ext uri="{FF2B5EF4-FFF2-40B4-BE49-F238E27FC236}">
+                <a16:creationId xmlns:a16="http://schemas.microsoft.com/office/drawing/2014/main" id="{900D40A9-4EF5-4748-8EBB-A2C0CCF6A3AB}"/>
+              </a:ext>
+            </a:extLst>
+          </p:cNvPr>
+          <p:cNvSpPr/>
+          <p:nvPr/>
+        </p:nvSpPr>
+        <p:spPr>
+          <a:xfrm>
+            <a:off x="0" y="6334780"/>
+            <a:ext cx="3583160" cy="523220"/>
+          </a:xfrm>
+          <a:prstGeom prst="rect">
+            <a:avLst/>
+          </a:prstGeom>
+          <a:noFill/>
+        </p:spPr>
+        <p:txBody>
+          <a:bodyPr wrap="none" lIns="91440" tIns="45720" rIns="91440" bIns="45720">
+            <a:spAutoFit/>
+          </a:bodyPr>
+          <a:lstStyle/>
+          <a:p>
+            <a:r>
+              <a:rPr lang="en-US" sz="2800" b="0" cap="none" spc="0" dirty="0">
+                <a:ln w="0"/>
+                <a:solidFill>
+                  <a:schemeClr val="tx1"/>
+                </a:solidFill>
+                <a:effectLst>
+                  <a:outerShdw blurRad="38100" dist="19050" dir="2700000" algn="tl" rotWithShape="0">
+                    <a:schemeClr val="dk1">
+                      <a:alpha val="40000"/>
+                    </a:schemeClr>
+                  </a:outerShdw>
+                </a:effectLst>
+              </a:rPr>
+              <a:t>IPC Communication 2.0</a:t>
+            </a:r>
+          </a:p>
+        </p:txBody>
+      </p:sp>
+    </p:spTree>
+    <p:extLst>
+      <p:ext uri="{BB962C8B-B14F-4D97-AF65-F5344CB8AC3E}">
+        <p14:creationId xmlns:p14="http://schemas.microsoft.com/office/powerpoint/2010/main" val="441570006"/>
       </p:ext>
     </p:extLst>
   </p:cSld>

</xml_diff>

<commit_message>
add packet documentator (for future usage)
</commit_message>
<xml_diff>
--- a/docs/architecture/SaltyEmu_Architecture.pptx
+++ b/docs/architecture/SaltyEmu_Architecture.pptx
@@ -9,6 +9,7 @@
     <p:sldId id="257" r:id="rId3"/>
     <p:sldId id="256" r:id="rId4"/>
     <p:sldId id="259" r:id="rId5"/>
+    <p:sldId id="260" r:id="rId6"/>
   </p:sldIdLst>
   <p:sldSz cx="12192000" cy="6858000"/>
   <p:notesSz cx="6858000" cy="9144000"/>
@@ -262,7 +263,7 @@
           <a:p>
             <a:fld id="{8203A14F-56F1-4AD3-96D1-19C1390E772B}" type="datetimeFigureOut">
               <a:rPr lang="en-US" smtClean="0"/>
-              <a:t>01/18/2019</a:t>
+              <a:t>2/27/2019</a:t>
             </a:fld>
             <a:endParaRPr lang="en-US"/>
           </a:p>
@@ -460,7 +461,7 @@
           <a:p>
             <a:fld id="{8203A14F-56F1-4AD3-96D1-19C1390E772B}" type="datetimeFigureOut">
               <a:rPr lang="en-US" smtClean="0"/>
-              <a:t>01/18/2019</a:t>
+              <a:t>2/27/2019</a:t>
             </a:fld>
             <a:endParaRPr lang="en-US"/>
           </a:p>
@@ -668,7 +669,7 @@
           <a:p>
             <a:fld id="{8203A14F-56F1-4AD3-96D1-19C1390E772B}" type="datetimeFigureOut">
               <a:rPr lang="en-US" smtClean="0"/>
-              <a:t>01/18/2019</a:t>
+              <a:t>2/27/2019</a:t>
             </a:fld>
             <a:endParaRPr lang="en-US"/>
           </a:p>
@@ -866,7 +867,7 @@
           <a:p>
             <a:fld id="{8203A14F-56F1-4AD3-96D1-19C1390E772B}" type="datetimeFigureOut">
               <a:rPr lang="en-US" smtClean="0"/>
-              <a:t>01/18/2019</a:t>
+              <a:t>2/27/2019</a:t>
             </a:fld>
             <a:endParaRPr lang="en-US"/>
           </a:p>
@@ -1141,7 +1142,7 @@
           <a:p>
             <a:fld id="{8203A14F-56F1-4AD3-96D1-19C1390E772B}" type="datetimeFigureOut">
               <a:rPr lang="en-US" smtClean="0"/>
-              <a:t>01/18/2019</a:t>
+              <a:t>2/27/2019</a:t>
             </a:fld>
             <a:endParaRPr lang="en-US"/>
           </a:p>
@@ -1406,7 +1407,7 @@
           <a:p>
             <a:fld id="{8203A14F-56F1-4AD3-96D1-19C1390E772B}" type="datetimeFigureOut">
               <a:rPr lang="en-US" smtClean="0"/>
-              <a:t>01/18/2019</a:t>
+              <a:t>2/27/2019</a:t>
             </a:fld>
             <a:endParaRPr lang="en-US"/>
           </a:p>
@@ -1818,7 +1819,7 @@
           <a:p>
             <a:fld id="{8203A14F-56F1-4AD3-96D1-19C1390E772B}" type="datetimeFigureOut">
               <a:rPr lang="en-US" smtClean="0"/>
-              <a:t>01/18/2019</a:t>
+              <a:t>2/27/2019</a:t>
             </a:fld>
             <a:endParaRPr lang="en-US"/>
           </a:p>
@@ -1959,7 +1960,7 @@
           <a:p>
             <a:fld id="{8203A14F-56F1-4AD3-96D1-19C1390E772B}" type="datetimeFigureOut">
               <a:rPr lang="en-US" smtClean="0"/>
-              <a:t>01/18/2019</a:t>
+              <a:t>2/27/2019</a:t>
             </a:fld>
             <a:endParaRPr lang="en-US"/>
           </a:p>
@@ -2072,7 +2073,7 @@
           <a:p>
             <a:fld id="{8203A14F-56F1-4AD3-96D1-19C1390E772B}" type="datetimeFigureOut">
               <a:rPr lang="en-US" smtClean="0"/>
-              <a:t>01/18/2019</a:t>
+              <a:t>2/27/2019</a:t>
             </a:fld>
             <a:endParaRPr lang="en-US"/>
           </a:p>
@@ -2383,7 +2384,7 @@
           <a:p>
             <a:fld id="{8203A14F-56F1-4AD3-96D1-19C1390E772B}" type="datetimeFigureOut">
               <a:rPr lang="en-US" smtClean="0"/>
-              <a:t>01/18/2019</a:t>
+              <a:t>2/27/2019</a:t>
             </a:fld>
             <a:endParaRPr lang="en-US"/>
           </a:p>
@@ -2671,7 +2672,7 @@
           <a:p>
             <a:fld id="{8203A14F-56F1-4AD3-96D1-19C1390E772B}" type="datetimeFigureOut">
               <a:rPr lang="en-US" smtClean="0"/>
-              <a:t>01/18/2019</a:t>
+              <a:t>2/27/2019</a:t>
             </a:fld>
             <a:endParaRPr lang="en-US"/>
           </a:p>
@@ -2912,7 +2913,7 @@
           <a:p>
             <a:fld id="{8203A14F-56F1-4AD3-96D1-19C1390E772B}" type="datetimeFigureOut">
               <a:rPr lang="en-US" smtClean="0"/>
-              <a:t>01/18/2019</a:t>
+              <a:t>2/27/2019</a:t>
             </a:fld>
             <a:endParaRPr lang="en-US"/>
           </a:p>
@@ -7281,6 +7282,117 @@
 </p:sld>
 </file>
 
+<file path=ppt/slides/slide5.xml><?xml version="1.0" encoding="utf-8"?>
+<p:sld xmlns:a="http://schemas.openxmlformats.org/drawingml/2006/main" xmlns:r="http://schemas.openxmlformats.org/officeDocument/2006/relationships" xmlns:p="http://schemas.openxmlformats.org/presentationml/2006/main">
+  <p:cSld>
+    <p:spTree>
+      <p:nvGrpSpPr>
+        <p:cNvPr id="1" name=""/>
+        <p:cNvGrpSpPr/>
+        <p:nvPr/>
+      </p:nvGrpSpPr>
+      <p:grpSpPr>
+        <a:xfrm>
+          <a:off x="0" y="0"/>
+          <a:ext cx="0" cy="0"/>
+          <a:chOff x="0" y="0"/>
+          <a:chExt cx="0" cy="0"/>
+        </a:xfrm>
+      </p:grpSpPr>
+      <p:sp>
+        <p:nvSpPr>
+          <p:cNvPr id="2" name="Title 1">
+            <a:extLst>
+              <a:ext uri="{FF2B5EF4-FFF2-40B4-BE49-F238E27FC236}">
+                <a16:creationId xmlns:a16="http://schemas.microsoft.com/office/drawing/2014/main" id="{80C908C8-8724-4ADA-9D61-B1B1492AA065}"/>
+              </a:ext>
+            </a:extLst>
+          </p:cNvPr>
+          <p:cNvSpPr>
+            <a:spLocks noGrp="1"/>
+          </p:cNvSpPr>
+          <p:nvPr>
+            <p:ph type="title"/>
+          </p:nvPr>
+        </p:nvSpPr>
+        <p:spPr/>
+        <p:txBody>
+          <a:bodyPr/>
+          <a:lstStyle/>
+          <a:p>
+            <a:r>
+              <a:rPr lang="en-US" dirty="0"/>
+              <a:t>Security</a:t>
+            </a:r>
+          </a:p>
+        </p:txBody>
+      </p:sp>
+      <p:sp>
+        <p:nvSpPr>
+          <p:cNvPr id="4" name="Rectangle 3">
+            <a:extLst>
+              <a:ext uri="{FF2B5EF4-FFF2-40B4-BE49-F238E27FC236}">
+                <a16:creationId xmlns:a16="http://schemas.microsoft.com/office/drawing/2014/main" id="{55B0607C-1E95-45C4-9595-1AC65367A82A}"/>
+              </a:ext>
+            </a:extLst>
+          </p:cNvPr>
+          <p:cNvSpPr/>
+          <p:nvPr/>
+        </p:nvSpPr>
+        <p:spPr>
+          <a:xfrm>
+            <a:off x="4279900" y="2281767"/>
+            <a:ext cx="1634066" cy="791633"/>
+          </a:xfrm>
+          <a:prstGeom prst="rect">
+            <a:avLst/>
+          </a:prstGeom>
+        </p:spPr>
+        <p:style>
+          <a:lnRef idx="2">
+            <a:schemeClr val="accent1">
+              <a:shade val="50000"/>
+            </a:schemeClr>
+          </a:lnRef>
+          <a:fillRef idx="1">
+            <a:schemeClr val="accent1"/>
+          </a:fillRef>
+          <a:effectRef idx="0">
+            <a:schemeClr val="accent1"/>
+          </a:effectRef>
+          <a:fontRef idx="minor">
+            <a:schemeClr val="lt1"/>
+          </a:fontRef>
+        </p:style>
+        <p:txBody>
+          <a:bodyPr rtlCol="0" anchor="ctr"/>
+          <a:lstStyle/>
+          <a:p>
+            <a:pPr algn="ctr"/>
+            <a:r>
+              <a:rPr lang="en-US" dirty="0" err="1"/>
+              <a:t>HashiCorp’s</a:t>
+            </a:r>
+            <a:r>
+              <a:rPr lang="en-US" dirty="0"/>
+              <a:t> Vault</a:t>
+            </a:r>
+          </a:p>
+        </p:txBody>
+      </p:sp>
+    </p:spTree>
+    <p:extLst>
+      <p:ext uri="{BB962C8B-B14F-4D97-AF65-F5344CB8AC3E}">
+        <p14:creationId xmlns:p14="http://schemas.microsoft.com/office/powerpoint/2010/main" val="2796572371"/>
+      </p:ext>
+    </p:extLst>
+  </p:cSld>
+  <p:clrMapOvr>
+    <a:masterClrMapping/>
+  </p:clrMapOvr>
+</p:sld>
+</file>
+
 <file path=ppt/theme/theme1.xml><?xml version="1.0" encoding="utf-8"?>
 <a:theme xmlns:a="http://schemas.openxmlformats.org/drawingml/2006/main" name="Office Theme">
   <a:themeElements>

</xml_diff>